<commit_message>
Plan revised until O2
</commit_message>
<xml_diff>
--- a/images/architecture.pptx
+++ b/images/architecture.pptx
@@ -245,7 +245,7 @@
           <a:p>
             <a:fld id="{A8F66B12-A8CE-554E-89EE-440543FBD2B7}" type="datetimeFigureOut">
               <a:rPr lang="en-US" smtClean="0"/>
-              <a:t>1/18/24</a:t>
+              <a:t>1/19/24</a:t>
             </a:fld>
             <a:endParaRPr lang="en-US"/>
           </a:p>
@@ -410,7 +410,7 @@
           <a:p>
             <a:fld id="{A8F66B12-A8CE-554E-89EE-440543FBD2B7}" type="datetimeFigureOut">
               <a:rPr lang="en-US" smtClean="0"/>
-              <a:t>1/18/24</a:t>
+              <a:t>1/19/24</a:t>
             </a:fld>
             <a:endParaRPr lang="en-US"/>
           </a:p>
@@ -585,7 +585,7 @@
           <a:p>
             <a:fld id="{A8F66B12-A8CE-554E-89EE-440543FBD2B7}" type="datetimeFigureOut">
               <a:rPr lang="en-US" smtClean="0"/>
-              <a:t>1/18/24</a:t>
+              <a:t>1/19/24</a:t>
             </a:fld>
             <a:endParaRPr lang="en-US"/>
           </a:p>
@@ -750,7 +750,7 @@
           <a:p>
             <a:fld id="{A8F66B12-A8CE-554E-89EE-440543FBD2B7}" type="datetimeFigureOut">
               <a:rPr lang="en-US" smtClean="0"/>
-              <a:t>1/18/24</a:t>
+              <a:t>1/19/24</a:t>
             </a:fld>
             <a:endParaRPr lang="en-US"/>
           </a:p>
@@ -991,7 +991,7 @@
           <a:p>
             <a:fld id="{A8F66B12-A8CE-554E-89EE-440543FBD2B7}" type="datetimeFigureOut">
               <a:rPr lang="en-US" smtClean="0"/>
-              <a:t>1/18/24</a:t>
+              <a:t>1/19/24</a:t>
             </a:fld>
             <a:endParaRPr lang="en-US"/>
           </a:p>
@@ -1218,7 +1218,7 @@
           <a:p>
             <a:fld id="{A8F66B12-A8CE-554E-89EE-440543FBD2B7}" type="datetimeFigureOut">
               <a:rPr lang="en-US" smtClean="0"/>
-              <a:t>1/18/24</a:t>
+              <a:t>1/19/24</a:t>
             </a:fld>
             <a:endParaRPr lang="en-US"/>
           </a:p>
@@ -1580,7 +1580,7 @@
           <a:p>
             <a:fld id="{A8F66B12-A8CE-554E-89EE-440543FBD2B7}" type="datetimeFigureOut">
               <a:rPr lang="en-US" smtClean="0"/>
-              <a:t>1/18/24</a:t>
+              <a:t>1/19/24</a:t>
             </a:fld>
             <a:endParaRPr lang="en-US"/>
           </a:p>
@@ -1693,7 +1693,7 @@
           <a:p>
             <a:fld id="{A8F66B12-A8CE-554E-89EE-440543FBD2B7}" type="datetimeFigureOut">
               <a:rPr lang="en-US" smtClean="0"/>
-              <a:t>1/18/24</a:t>
+              <a:t>1/19/24</a:t>
             </a:fld>
             <a:endParaRPr lang="en-US"/>
           </a:p>
@@ -1783,7 +1783,7 @@
           <a:p>
             <a:fld id="{A8F66B12-A8CE-554E-89EE-440543FBD2B7}" type="datetimeFigureOut">
               <a:rPr lang="en-US" smtClean="0"/>
-              <a:t>1/18/24</a:t>
+              <a:t>1/19/24</a:t>
             </a:fld>
             <a:endParaRPr lang="en-US"/>
           </a:p>
@@ -2055,7 +2055,7 @@
           <a:p>
             <a:fld id="{A8F66B12-A8CE-554E-89EE-440543FBD2B7}" type="datetimeFigureOut">
               <a:rPr lang="en-US" smtClean="0"/>
-              <a:t>1/18/24</a:t>
+              <a:t>1/19/24</a:t>
             </a:fld>
             <a:endParaRPr lang="en-US"/>
           </a:p>
@@ -2307,7 +2307,7 @@
           <a:p>
             <a:fld id="{A8F66B12-A8CE-554E-89EE-440543FBD2B7}" type="datetimeFigureOut">
               <a:rPr lang="en-US" smtClean="0"/>
-              <a:t>1/18/24</a:t>
+              <a:t>1/19/24</a:t>
             </a:fld>
             <a:endParaRPr lang="en-US"/>
           </a:p>
@@ -2515,7 +2515,7 @@
           <a:p>
             <a:fld id="{A8F66B12-A8CE-554E-89EE-440543FBD2B7}" type="datetimeFigureOut">
               <a:rPr lang="en-US" smtClean="0"/>
-              <a:t>1/18/24</a:t>
+              <a:t>1/19/24</a:t>
             </a:fld>
             <a:endParaRPr lang="en-US"/>
           </a:p>
@@ -7257,8 +7257,8 @@
             <a:chExt cx="6632133" cy="3664121"/>
           </a:xfrm>
         </p:grpSpPr>
-        <mc:AlternateContent xmlns:mc="http://schemas.openxmlformats.org/markup-compatibility/2006">
-          <mc:Choice xmlns:a14="http://schemas.microsoft.com/office/drawing/2010/main" Requires="a14">
+        <mc:AlternateContent xmlns:mc="http://schemas.openxmlformats.org/markup-compatibility/2006" xmlns:a14="http://schemas.microsoft.com/office/drawing/2010/main">
+          <mc:Choice Requires="a14">
             <p:sp>
               <p:nvSpPr>
                 <p:cNvPr id="52" name="TextBox 51">
@@ -7469,7 +7469,7 @@
               </p:txBody>
             </p:sp>
           </mc:Choice>
-          <mc:Fallback>
+          <mc:Fallback xmlns="">
             <p:sp>
               <p:nvSpPr>
                 <p:cNvPr id="52" name="TextBox 51">
@@ -7611,8 +7611,8 @@
             </a:p>
           </p:txBody>
         </p:sp>
-        <mc:AlternateContent xmlns:mc="http://schemas.openxmlformats.org/markup-compatibility/2006">
-          <mc:Choice xmlns:a14="http://schemas.microsoft.com/office/drawing/2010/main" Requires="a14">
+        <mc:AlternateContent xmlns:mc="http://schemas.openxmlformats.org/markup-compatibility/2006" xmlns:a14="http://schemas.microsoft.com/office/drawing/2010/main">
+          <mc:Choice Requires="a14">
             <p:sp>
               <p:nvSpPr>
                 <p:cNvPr id="55" name="TextBox 54">
@@ -7788,7 +7788,7 @@
               </p:txBody>
             </p:sp>
           </mc:Choice>
-          <mc:Fallback>
+          <mc:Fallback xmlns="">
             <p:sp>
               <p:nvSpPr>
                 <p:cNvPr id="55" name="TextBox 54">
@@ -7836,8 +7836,8 @@
             </p:sp>
           </mc:Fallback>
         </mc:AlternateContent>
-        <mc:AlternateContent xmlns:mc="http://schemas.openxmlformats.org/markup-compatibility/2006">
-          <mc:Choice xmlns:a14="http://schemas.microsoft.com/office/drawing/2010/main" Requires="a14">
+        <mc:AlternateContent xmlns:mc="http://schemas.openxmlformats.org/markup-compatibility/2006" xmlns:a14="http://schemas.microsoft.com/office/drawing/2010/main">
+          <mc:Choice Requires="a14">
             <p:sp>
               <p:nvSpPr>
                 <p:cNvPr id="58" name="TextBox 57">
@@ -7907,7 +7907,7 @@
               </p:txBody>
             </p:sp>
           </mc:Choice>
-          <mc:Fallback>
+          <mc:Fallback xmlns="">
             <p:sp>
               <p:nvSpPr>
                 <p:cNvPr id="58" name="TextBox 57">
@@ -8098,8 +8098,8 @@
             </a:fontRef>
           </p:style>
         </p:cxnSp>
-        <mc:AlternateContent xmlns:mc="http://schemas.openxmlformats.org/markup-compatibility/2006">
-          <mc:Choice xmlns:a14="http://schemas.microsoft.com/office/drawing/2010/main" Requires="a14">
+        <mc:AlternateContent xmlns:mc="http://schemas.openxmlformats.org/markup-compatibility/2006" xmlns:a14="http://schemas.microsoft.com/office/drawing/2010/main">
+          <mc:Choice Requires="a14">
             <p:sp>
               <p:nvSpPr>
                 <p:cNvPr id="65" name="TextBox 64">
@@ -8169,7 +8169,7 @@
               </p:txBody>
             </p:sp>
           </mc:Choice>
-          <mc:Fallback>
+          <mc:Fallback xmlns="">
             <p:sp>
               <p:nvSpPr>
                 <p:cNvPr id="65" name="TextBox 64">
@@ -8410,8 +8410,8 @@
             </a:p>
           </p:txBody>
         </p:sp>
-        <mc:AlternateContent xmlns:mc="http://schemas.openxmlformats.org/markup-compatibility/2006">
-          <mc:Choice xmlns:a14="http://schemas.microsoft.com/office/drawing/2010/main" Requires="a14">
+        <mc:AlternateContent xmlns:mc="http://schemas.openxmlformats.org/markup-compatibility/2006" xmlns:a14="http://schemas.microsoft.com/office/drawing/2010/main">
+          <mc:Choice Requires="a14">
             <p:sp>
               <p:nvSpPr>
                 <p:cNvPr id="72" name="TextBox 71">
@@ -8575,7 +8575,7 @@
               </p:txBody>
             </p:sp>
           </mc:Choice>
-          <mc:Fallback>
+          <mc:Fallback xmlns="">
             <p:sp>
               <p:nvSpPr>
                 <p:cNvPr id="72" name="TextBox 71">
@@ -8769,8 +8769,8 @@
             </a:fontRef>
           </p:style>
         </p:cxnSp>
-        <mc:AlternateContent xmlns:mc="http://schemas.openxmlformats.org/markup-compatibility/2006">
-          <mc:Choice xmlns:a14="http://schemas.microsoft.com/office/drawing/2010/main" Requires="a14">
+        <mc:AlternateContent xmlns:mc="http://schemas.openxmlformats.org/markup-compatibility/2006" xmlns:a14="http://schemas.microsoft.com/office/drawing/2010/main">
+          <mc:Choice Requires="a14">
             <p:sp>
               <p:nvSpPr>
                 <p:cNvPr id="76" name="TextBox 75">
@@ -8878,7 +8878,7 @@
               </p:txBody>
             </p:sp>
           </mc:Choice>
-          <mc:Fallback>
+          <mc:Fallback xmlns="">
             <p:sp>
               <p:nvSpPr>
                 <p:cNvPr id="76" name="TextBox 75">
@@ -8923,8 +8923,8 @@
             </p:sp>
           </mc:Fallback>
         </mc:AlternateContent>
-        <mc:AlternateContent xmlns:mc="http://schemas.openxmlformats.org/markup-compatibility/2006">
-          <mc:Choice xmlns:a14="http://schemas.microsoft.com/office/drawing/2010/main" Requires="a14">
+        <mc:AlternateContent xmlns:mc="http://schemas.openxmlformats.org/markup-compatibility/2006" xmlns:a14="http://schemas.microsoft.com/office/drawing/2010/main">
+          <mc:Choice Requires="a14">
             <p:sp>
               <p:nvSpPr>
                 <p:cNvPr id="77" name="TextBox 76">
@@ -9026,7 +9026,7 @@
               </p:txBody>
             </p:sp>
           </mc:Choice>
-          <mc:Fallback>
+          <mc:Fallback xmlns="">
             <p:sp>
               <p:nvSpPr>
                 <p:cNvPr id="77" name="TextBox 76">
@@ -9283,8 +9283,8 @@
             </a:fontRef>
           </p:style>
         </p:cxnSp>
-        <mc:AlternateContent xmlns:mc="http://schemas.openxmlformats.org/markup-compatibility/2006">
-          <mc:Choice xmlns:a14="http://schemas.microsoft.com/office/drawing/2010/main" Requires="a14">
+        <mc:AlternateContent xmlns:mc="http://schemas.openxmlformats.org/markup-compatibility/2006" xmlns:a14="http://schemas.microsoft.com/office/drawing/2010/main">
+          <mc:Choice Requires="a14">
             <p:sp>
               <p:nvSpPr>
                 <p:cNvPr id="82" name="Rectangle 81">
@@ -9488,7 +9488,7 @@
               </p:txBody>
             </p:sp>
           </mc:Choice>
-          <mc:Fallback>
+          <mc:Fallback xmlns="">
             <p:sp>
               <p:nvSpPr>
                 <p:cNvPr id="82" name="Rectangle 81">
@@ -9533,8 +9533,8 @@
             </p:sp>
           </mc:Fallback>
         </mc:AlternateContent>
-        <mc:AlternateContent xmlns:mc="http://schemas.openxmlformats.org/markup-compatibility/2006">
-          <mc:Choice xmlns:a14="http://schemas.microsoft.com/office/drawing/2010/main" Requires="a14">
+        <mc:AlternateContent xmlns:mc="http://schemas.openxmlformats.org/markup-compatibility/2006" xmlns:a14="http://schemas.microsoft.com/office/drawing/2010/main">
+          <mc:Choice Requires="a14">
             <p:sp>
               <p:nvSpPr>
                 <p:cNvPr id="84" name="TextBox 83">
@@ -9616,7 +9616,7 @@
               </p:txBody>
             </p:sp>
           </mc:Choice>
-          <mc:Fallback>
+          <mc:Fallback xmlns="">
             <p:sp>
               <p:nvSpPr>
                 <p:cNvPr id="84" name="TextBox 83">
@@ -9661,8 +9661,8 @@
             </p:sp>
           </mc:Fallback>
         </mc:AlternateContent>
-        <mc:AlternateContent xmlns:mc="http://schemas.openxmlformats.org/markup-compatibility/2006">
-          <mc:Choice xmlns:a14="http://schemas.microsoft.com/office/drawing/2010/main" Requires="a14">
+        <mc:AlternateContent xmlns:mc="http://schemas.openxmlformats.org/markup-compatibility/2006" xmlns:a14="http://schemas.microsoft.com/office/drawing/2010/main">
+          <mc:Choice Requires="a14">
             <p:sp>
               <p:nvSpPr>
                 <p:cNvPr id="85" name="Rectangle 84">
@@ -9753,7 +9753,7 @@
               </p:txBody>
             </p:sp>
           </mc:Choice>
-          <mc:Fallback>
+          <mc:Fallback xmlns="">
             <p:sp>
               <p:nvSpPr>
                 <p:cNvPr id="85" name="Rectangle 84">
@@ -9798,8 +9798,8 @@
             </p:sp>
           </mc:Fallback>
         </mc:AlternateContent>
-        <mc:AlternateContent xmlns:mc="http://schemas.openxmlformats.org/markup-compatibility/2006">
-          <mc:Choice xmlns:a14="http://schemas.microsoft.com/office/drawing/2010/main" Requires="a14">
+        <mc:AlternateContent xmlns:mc="http://schemas.openxmlformats.org/markup-compatibility/2006" xmlns:a14="http://schemas.microsoft.com/office/drawing/2010/main">
+          <mc:Choice Requires="a14">
             <p:sp>
               <p:nvSpPr>
                 <p:cNvPr id="93" name="Rectangle 92">
@@ -9883,7 +9883,7 @@
               </p:txBody>
             </p:sp>
           </mc:Choice>
-          <mc:Fallback>
+          <mc:Fallback xmlns="">
             <p:sp>
               <p:nvSpPr>
                 <p:cNvPr id="93" name="Rectangle 92">
@@ -10628,8 +10628,8 @@
             </a:fontRef>
           </p:style>
         </p:cxnSp>
-        <mc:AlternateContent xmlns:mc="http://schemas.openxmlformats.org/markup-compatibility/2006">
-          <mc:Choice xmlns:a14="http://schemas.microsoft.com/office/drawing/2010/main" Requires="a14">
+        <mc:AlternateContent xmlns:mc="http://schemas.openxmlformats.org/markup-compatibility/2006" xmlns:a14="http://schemas.microsoft.com/office/drawing/2010/main">
+          <mc:Choice Requires="a14">
             <p:sp>
               <p:nvSpPr>
                 <p:cNvPr id="309" name="TextBox 308">
@@ -10696,7 +10696,7 @@
               </p:txBody>
             </p:sp>
           </mc:Choice>
-          <mc:Fallback>
+          <mc:Fallback xmlns="">
             <p:sp>
               <p:nvSpPr>
                 <p:cNvPr id="309" name="TextBox 308">
@@ -10741,8 +10741,8 @@
             </p:sp>
           </mc:Fallback>
         </mc:AlternateContent>
-        <mc:AlternateContent xmlns:mc="http://schemas.openxmlformats.org/markup-compatibility/2006">
-          <mc:Choice xmlns:a14="http://schemas.microsoft.com/office/drawing/2010/main" Requires="a14">
+        <mc:AlternateContent xmlns:mc="http://schemas.openxmlformats.org/markup-compatibility/2006" xmlns:a14="http://schemas.microsoft.com/office/drawing/2010/main">
+          <mc:Choice Requires="a14">
             <p:sp>
               <p:nvSpPr>
                 <p:cNvPr id="310" name="TextBox 309">
@@ -10810,7 +10810,7 @@
               </p:txBody>
             </p:sp>
           </mc:Choice>
-          <mc:Fallback>
+          <mc:Fallback xmlns="">
             <p:sp>
               <p:nvSpPr>
                 <p:cNvPr id="310" name="TextBox 309">
@@ -10855,8 +10855,8 @@
             </p:sp>
           </mc:Fallback>
         </mc:AlternateContent>
-        <mc:AlternateContent xmlns:mc="http://schemas.openxmlformats.org/markup-compatibility/2006">
-          <mc:Choice xmlns:a14="http://schemas.microsoft.com/office/drawing/2010/main" Requires="a14">
+        <mc:AlternateContent xmlns:mc="http://schemas.openxmlformats.org/markup-compatibility/2006" xmlns:a14="http://schemas.microsoft.com/office/drawing/2010/main">
+          <mc:Choice Requires="a14">
             <p:sp>
               <p:nvSpPr>
                 <p:cNvPr id="313" name="TextBox 312">
@@ -10939,7 +10939,7 @@
               </p:txBody>
             </p:sp>
           </mc:Choice>
-          <mc:Fallback>
+          <mc:Fallback xmlns="">
             <p:sp>
               <p:nvSpPr>
                 <p:cNvPr id="313" name="TextBox 312">
@@ -11352,7 +11352,7 @@
                     <a:schemeClr val="tx1"/>
                   </a:solidFill>
                 </a:rPr>
-                <a:t>Classifies (O1)</a:t>
+                <a:t>Labeler (O1)</a:t>
               </a:r>
             </a:p>
           </p:txBody>
@@ -11838,8 +11838,8 @@
             </a:p>
           </p:txBody>
         </p:sp>
-        <mc:AlternateContent xmlns:mc="http://schemas.openxmlformats.org/markup-compatibility/2006">
-          <mc:Choice xmlns:a14="http://schemas.microsoft.com/office/drawing/2010/main" Requires="a14">
+        <mc:AlternateContent xmlns:mc="http://schemas.openxmlformats.org/markup-compatibility/2006" xmlns:a14="http://schemas.microsoft.com/office/drawing/2010/main">
+          <mc:Choice Requires="a14">
             <p:sp>
               <p:nvSpPr>
                 <p:cNvPr id="43" name="TextBox 42">
@@ -11927,7 +11927,7 @@
               </p:txBody>
             </p:sp>
           </mc:Choice>
-          <mc:Fallback>
+          <mc:Fallback xmlns="">
             <p:sp>
               <p:nvSpPr>
                 <p:cNvPr id="43" name="TextBox 42">

</xml_diff>